<commit_message>
Added p-value appendix slide
</commit_message>
<xml_diff>
--- a/images/Johnny Dryman - Phase 2 Project Presentation.pptx
+++ b/images/Johnny Dryman - Phase 2 Project Presentation.pptx
@@ -19,6 +19,7 @@
     <p:sldId id="270" r:id="rId13"/>
     <p:sldId id="269" r:id="rId14"/>
     <p:sldId id="271" r:id="rId15"/>
+    <p:sldId id="276" r:id="rId16"/>
   </p:sldIdLst>
   <p:sldSz cx="12192000" cy="6858000"/>
   <p:notesSz cx="6858000" cy="9144000"/>
@@ -7700,7 +7701,7 @@
           <a:p>
             <a:fld id="{76969C88-B244-455D-A017-012B25B1ACDD}" type="datetimeFigureOut">
               <a:rPr lang="en-US" smtClean="0"/>
-              <a:t>5/1/2021</a:t>
+              <a:t>5/3/2021</a:t>
             </a:fld>
             <a:endParaRPr lang="en-US"/>
           </a:p>
@@ -7898,7 +7899,7 @@
           <a:p>
             <a:fld id="{76969C88-B244-455D-A017-012B25B1ACDD}" type="datetimeFigureOut">
               <a:rPr lang="en-US" smtClean="0"/>
-              <a:t>5/1/2021</a:t>
+              <a:t>5/3/2021</a:t>
             </a:fld>
             <a:endParaRPr lang="en-US"/>
           </a:p>
@@ -8106,7 +8107,7 @@
           <a:p>
             <a:fld id="{76969C88-B244-455D-A017-012B25B1ACDD}" type="datetimeFigureOut">
               <a:rPr lang="en-US" smtClean="0"/>
-              <a:t>5/1/2021</a:t>
+              <a:t>5/3/2021</a:t>
             </a:fld>
             <a:endParaRPr lang="en-US"/>
           </a:p>
@@ -8304,7 +8305,7 @@
           <a:p>
             <a:fld id="{76969C88-B244-455D-A017-012B25B1ACDD}" type="datetimeFigureOut">
               <a:rPr lang="en-US" smtClean="0"/>
-              <a:t>5/1/2021</a:t>
+              <a:t>5/3/2021</a:t>
             </a:fld>
             <a:endParaRPr lang="en-US"/>
           </a:p>
@@ -8579,7 +8580,7 @@
           <a:p>
             <a:fld id="{76969C88-B244-455D-A017-012B25B1ACDD}" type="datetimeFigureOut">
               <a:rPr lang="en-US" smtClean="0"/>
-              <a:t>5/1/2021</a:t>
+              <a:t>5/3/2021</a:t>
             </a:fld>
             <a:endParaRPr lang="en-US"/>
           </a:p>
@@ -8844,7 +8845,7 @@
           <a:p>
             <a:fld id="{76969C88-B244-455D-A017-012B25B1ACDD}" type="datetimeFigureOut">
               <a:rPr lang="en-US" smtClean="0"/>
-              <a:t>5/1/2021</a:t>
+              <a:t>5/3/2021</a:t>
             </a:fld>
             <a:endParaRPr lang="en-US"/>
           </a:p>
@@ -9256,7 +9257,7 @@
           <a:p>
             <a:fld id="{76969C88-B244-455D-A017-012B25B1ACDD}" type="datetimeFigureOut">
               <a:rPr lang="en-US" smtClean="0"/>
-              <a:t>5/1/2021</a:t>
+              <a:t>5/3/2021</a:t>
             </a:fld>
             <a:endParaRPr lang="en-US"/>
           </a:p>
@@ -9397,7 +9398,7 @@
           <a:p>
             <a:fld id="{76969C88-B244-455D-A017-012B25B1ACDD}" type="datetimeFigureOut">
               <a:rPr lang="en-US" smtClean="0"/>
-              <a:t>5/1/2021</a:t>
+              <a:t>5/3/2021</a:t>
             </a:fld>
             <a:endParaRPr lang="en-US"/>
           </a:p>
@@ -9510,7 +9511,7 @@
           <a:p>
             <a:fld id="{76969C88-B244-455D-A017-012B25B1ACDD}" type="datetimeFigureOut">
               <a:rPr lang="en-US" smtClean="0"/>
-              <a:t>5/1/2021</a:t>
+              <a:t>5/3/2021</a:t>
             </a:fld>
             <a:endParaRPr lang="en-US"/>
           </a:p>
@@ -9821,7 +9822,7 @@
           <a:p>
             <a:fld id="{76969C88-B244-455D-A017-012B25B1ACDD}" type="datetimeFigureOut">
               <a:rPr lang="en-US" smtClean="0"/>
-              <a:t>5/1/2021</a:t>
+              <a:t>5/3/2021</a:t>
             </a:fld>
             <a:endParaRPr lang="en-US"/>
           </a:p>
@@ -10109,7 +10110,7 @@
           <a:p>
             <a:fld id="{76969C88-B244-455D-A017-012B25B1ACDD}" type="datetimeFigureOut">
               <a:rPr lang="en-US" smtClean="0"/>
-              <a:t>5/1/2021</a:t>
+              <a:t>5/3/2021</a:t>
             </a:fld>
             <a:endParaRPr lang="en-US"/>
           </a:p>
@@ -10351,7 +10352,7 @@
             <a:fld id="{76969C88-B244-455D-A017-012B25B1ACDD}" type="datetimeFigureOut">
               <a:rPr lang="en-US" smtClean="0"/>
               <a:pPr/>
-              <a:t>5/1/2021</a:t>
+              <a:t>5/3/2021</a:t>
             </a:fld>
             <a:endParaRPr lang="en-US"/>
           </a:p>
@@ -12789,6 +12790,182 @@
 </p:sld>
 </file>
 
+<file path=ppt/slides/slide15.xml><?xml version="1.0" encoding="utf-8"?>
+<p:sld xmlns:a="http://schemas.openxmlformats.org/drawingml/2006/main" xmlns:r="http://schemas.openxmlformats.org/officeDocument/2006/relationships" xmlns:p="http://schemas.openxmlformats.org/presentationml/2006/main">
+  <p:cSld>
+    <p:bg>
+      <p:bgPr>
+        <a:solidFill>
+          <a:schemeClr val="bg1"/>
+        </a:solidFill>
+        <a:effectLst/>
+      </p:bgPr>
+    </p:bg>
+    <p:spTree>
+      <p:nvGrpSpPr>
+        <p:cNvPr id="1" name=""/>
+        <p:cNvGrpSpPr/>
+        <p:nvPr/>
+      </p:nvGrpSpPr>
+      <p:grpSpPr>
+        <a:xfrm>
+          <a:off x="0" y="0"/>
+          <a:ext cx="0" cy="0"/>
+          <a:chOff x="0" y="0"/>
+          <a:chExt cx="0" cy="0"/>
+        </a:xfrm>
+      </p:grpSpPr>
+      <p:sp>
+        <p:nvSpPr>
+          <p:cNvPr id="10" name="Rectangle 9">
+            <a:extLst>
+              <a:ext uri="{FF2B5EF4-FFF2-40B4-BE49-F238E27FC236}">
+                <a16:creationId xmlns:a16="http://schemas.microsoft.com/office/drawing/2014/main" id="{1707FC24-6981-43D9-B525-C7832BA22463}"/>
+              </a:ext>
+              <a:ext uri="{C183D7F6-B498-43B3-948B-1728B52AA6E4}">
+                <adec:decorative xmlns:adec="http://schemas.microsoft.com/office/drawing/2017/decorative" val="1"/>
+              </a:ext>
+            </a:extLst>
+          </p:cNvPr>
+          <p:cNvSpPr>
+            <a:spLocks noGrp="1" noRot="1" noChangeAspect="1" noMove="1" noResize="1" noEditPoints="1" noAdjustHandles="1" noChangeArrowheads="1" noChangeShapeType="1" noTextEdit="1"/>
+          </p:cNvSpPr>
+          <p:nvPr>
+            <p:extLst>
+              <p:ext uri="{386F3935-93C4-4BCD-93E2-E3B085C9AB24}">
+                <p16:designElem xmlns:p16="http://schemas.microsoft.com/office/powerpoint/2015/main" val="1"/>
+              </p:ext>
+            </p:extLst>
+          </p:nvPr>
+        </p:nvSpPr>
+        <p:spPr bwMode="ltGray">
+          <a:xfrm>
+            <a:off x="336884" y="311449"/>
+            <a:ext cx="4332307" cy="6179552"/>
+          </a:xfrm>
+          <a:prstGeom prst="rect">
+            <a:avLst/>
+          </a:prstGeom>
+          <a:solidFill>
+            <a:srgbClr val="404040"/>
+          </a:solidFill>
+          <a:ln w="127000" cap="sq" cmpd="thinThick">
+            <a:solidFill>
+              <a:srgbClr val="404040"/>
+            </a:solidFill>
+          </a:ln>
+        </p:spPr>
+        <p:style>
+          <a:lnRef idx="2">
+            <a:schemeClr val="accent1">
+              <a:shade val="50000"/>
+            </a:schemeClr>
+          </a:lnRef>
+          <a:fillRef idx="1">
+            <a:schemeClr val="accent1"/>
+          </a:fillRef>
+          <a:effectRef idx="0">
+            <a:schemeClr val="accent1"/>
+          </a:effectRef>
+          <a:fontRef idx="minor">
+            <a:schemeClr val="lt1"/>
+          </a:fontRef>
+        </p:style>
+        <p:txBody>
+          <a:bodyPr rtlCol="0" anchor="ctr"/>
+          <a:lstStyle/>
+          <a:p>
+            <a:pPr algn="ctr"/>
+            <a:endParaRPr lang="en-US"/>
+          </a:p>
+        </p:txBody>
+      </p:sp>
+      <p:sp>
+        <p:nvSpPr>
+          <p:cNvPr id="2" name="Title 1">
+            <a:extLst>
+              <a:ext uri="{FF2B5EF4-FFF2-40B4-BE49-F238E27FC236}">
+                <a16:creationId xmlns:a16="http://schemas.microsoft.com/office/drawing/2014/main" id="{DC54F634-E00E-4E9D-9C03-EFACD071DF0C}"/>
+              </a:ext>
+            </a:extLst>
+          </p:cNvPr>
+          <p:cNvSpPr>
+            <a:spLocks noGrp="1"/>
+          </p:cNvSpPr>
+          <p:nvPr>
+            <p:ph type="title"/>
+          </p:nvPr>
+        </p:nvSpPr>
+        <p:spPr>
+          <a:xfrm>
+            <a:off x="742950" y="742951"/>
+            <a:ext cx="3476625" cy="4962524"/>
+          </a:xfrm>
+        </p:spPr>
+        <p:txBody>
+          <a:bodyPr vert="horz" lIns="91440" tIns="45720" rIns="91440" bIns="45720" rtlCol="0" anchor="ctr">
+            <a:normAutofit/>
+          </a:bodyPr>
+          <a:lstStyle/>
+          <a:p>
+            <a:pPr algn="ctr"/>
+            <a:r>
+              <a:rPr lang="en-US" sz="4800" kern="1200">
+                <a:solidFill>
+                  <a:srgbClr val="FFFFFF"/>
+                </a:solidFill>
+                <a:latin typeface="+mj-lt"/>
+                <a:ea typeface="+mj-ea"/>
+                <a:cs typeface="+mj-cs"/>
+              </a:rPr>
+              <a:t>P-Value Rankings</a:t>
+            </a:r>
+          </a:p>
+        </p:txBody>
+      </p:sp>
+      <p:pic>
+        <p:nvPicPr>
+          <p:cNvPr id="5" name="Picture 4">
+            <a:extLst>
+              <a:ext uri="{FF2B5EF4-FFF2-40B4-BE49-F238E27FC236}">
+                <a16:creationId xmlns:a16="http://schemas.microsoft.com/office/drawing/2014/main" id="{3E215135-67A4-4C1D-8B4F-0C31CAB85EE1}"/>
+              </a:ext>
+            </a:extLst>
+          </p:cNvPr>
+          <p:cNvPicPr>
+            <a:picLocks noChangeAspect="1"/>
+          </p:cNvPicPr>
+          <p:nvPr/>
+        </p:nvPicPr>
+        <p:blipFill>
+          <a:blip r:embed="rId2"/>
+          <a:stretch>
+            <a:fillRect/>
+          </a:stretch>
+        </p:blipFill>
+        <p:spPr>
+          <a:xfrm>
+            <a:off x="6808969" y="488602"/>
+            <a:ext cx="3424123" cy="5880796"/>
+          </a:xfrm>
+          <a:prstGeom prst="rect">
+            <a:avLst/>
+          </a:prstGeom>
+        </p:spPr>
+      </p:pic>
+    </p:spTree>
+    <p:extLst>
+      <p:ext uri="{BB962C8B-B14F-4D97-AF65-F5344CB8AC3E}">
+        <p14:creationId xmlns:p14="http://schemas.microsoft.com/office/powerpoint/2010/main" val="3295773523"/>
+      </p:ext>
+    </p:extLst>
+  </p:cSld>
+  <p:clrMapOvr>
+    <a:masterClrMapping/>
+  </p:clrMapOvr>
+</p:sld>
+</file>
+
 <file path=ppt/slides/slide2.xml><?xml version="1.0" encoding="utf-8"?>
 <p:sld xmlns:a="http://schemas.openxmlformats.org/drawingml/2006/main" xmlns:r="http://schemas.openxmlformats.org/officeDocument/2006/relationships" xmlns:p="http://schemas.openxmlformats.org/presentationml/2006/main">
   <p:cSld>

</xml_diff>